<commit_message>
Clase 08 mayo 2024
</commit_message>
<xml_diff>
--- a/Docs/Modulo-III-Docs/02_CSS.pptx
+++ b/Docs/Modulo-III-Docs/02_CSS.pptx
@@ -332,7 +332,7 @@
           <a:p>
             <a:fld id="{A6D3EF77-317B-41C0-9349-43E9BC462C98}" type="datetimeFigureOut">
               <a:rPr lang="es-MX" smtClean="0"/>
-              <a:t>06/05/2024</a:t>
+              <a:t>08/05/2024</a:t>
             </a:fld>
             <a:endParaRPr lang="es-MX"/>
           </a:p>
@@ -630,7 +630,7 @@
           <a:p>
             <a:fld id="{A6D3EF77-317B-41C0-9349-43E9BC462C98}" type="datetimeFigureOut">
               <a:rPr lang="es-MX" smtClean="0"/>
-              <a:t>06/05/2024</a:t>
+              <a:t>08/05/2024</a:t>
             </a:fld>
             <a:endParaRPr lang="es-MX"/>
           </a:p>
@@ -822,7 +822,7 @@
           <a:p>
             <a:fld id="{A6D3EF77-317B-41C0-9349-43E9BC462C98}" type="datetimeFigureOut">
               <a:rPr lang="es-MX" smtClean="0"/>
-              <a:t>06/05/2024</a:t>
+              <a:t>08/05/2024</a:t>
             </a:fld>
             <a:endParaRPr lang="es-MX"/>
           </a:p>
@@ -1083,7 +1083,7 @@
           <a:p>
             <a:fld id="{A6D3EF77-317B-41C0-9349-43E9BC462C98}" type="datetimeFigureOut">
               <a:rPr lang="es-MX" smtClean="0"/>
-              <a:t>06/05/2024</a:t>
+              <a:t>08/05/2024</a:t>
             </a:fld>
             <a:endParaRPr lang="es-MX"/>
           </a:p>
@@ -1507,7 +1507,7 @@
           <a:p>
             <a:fld id="{A6D3EF77-317B-41C0-9349-43E9BC462C98}" type="datetimeFigureOut">
               <a:rPr lang="es-MX" smtClean="0"/>
-              <a:t>06/05/2024</a:t>
+              <a:t>08/05/2024</a:t>
             </a:fld>
             <a:endParaRPr lang="es-MX"/>
           </a:p>
@@ -2044,7 +2044,7 @@
           <a:p>
             <a:fld id="{A6D3EF77-317B-41C0-9349-43E9BC462C98}" type="datetimeFigureOut">
               <a:rPr lang="es-MX" smtClean="0"/>
-              <a:t>06/05/2024</a:t>
+              <a:t>08/05/2024</a:t>
             </a:fld>
             <a:endParaRPr lang="es-MX"/>
           </a:p>
@@ -2908,7 +2908,7 @@
           <a:p>
             <a:fld id="{A6D3EF77-317B-41C0-9349-43E9BC462C98}" type="datetimeFigureOut">
               <a:rPr lang="es-MX" smtClean="0"/>
-              <a:t>06/05/2024</a:t>
+              <a:t>08/05/2024</a:t>
             </a:fld>
             <a:endParaRPr lang="es-MX"/>
           </a:p>
@@ -3078,7 +3078,7 @@
           <a:p>
             <a:fld id="{A6D3EF77-317B-41C0-9349-43E9BC462C98}" type="datetimeFigureOut">
               <a:rPr lang="es-MX" smtClean="0"/>
-              <a:t>06/05/2024</a:t>
+              <a:t>08/05/2024</a:t>
             </a:fld>
             <a:endParaRPr lang="es-MX"/>
           </a:p>
@@ -3262,7 +3262,7 @@
           <a:p>
             <a:fld id="{A6D3EF77-317B-41C0-9349-43E9BC462C98}" type="datetimeFigureOut">
               <a:rPr lang="es-MX" smtClean="0"/>
-              <a:t>06/05/2024</a:t>
+              <a:t>08/05/2024</a:t>
             </a:fld>
             <a:endParaRPr lang="es-MX"/>
           </a:p>
@@ -3432,7 +3432,7 @@
           <a:p>
             <a:fld id="{A6D3EF77-317B-41C0-9349-43E9BC462C98}" type="datetimeFigureOut">
               <a:rPr lang="es-MX" smtClean="0"/>
-              <a:t>06/05/2024</a:t>
+              <a:t>08/05/2024</a:t>
             </a:fld>
             <a:endParaRPr lang="es-MX"/>
           </a:p>
@@ -3676,7 +3676,7 @@
           <a:p>
             <a:fld id="{A6D3EF77-317B-41C0-9349-43E9BC462C98}" type="datetimeFigureOut">
               <a:rPr lang="es-MX" smtClean="0"/>
-              <a:t>06/05/2024</a:t>
+              <a:t>08/05/2024</a:t>
             </a:fld>
             <a:endParaRPr lang="es-MX"/>
           </a:p>
@@ -3912,7 +3912,7 @@
           <a:p>
             <a:fld id="{A6D3EF77-317B-41C0-9349-43E9BC462C98}" type="datetimeFigureOut">
               <a:rPr lang="es-MX" smtClean="0"/>
-              <a:t>06/05/2024</a:t>
+              <a:t>08/05/2024</a:t>
             </a:fld>
             <a:endParaRPr lang="es-MX"/>
           </a:p>
@@ -4378,7 +4378,7 @@
           <a:p>
             <a:fld id="{A6D3EF77-317B-41C0-9349-43E9BC462C98}" type="datetimeFigureOut">
               <a:rPr lang="es-MX" smtClean="0"/>
-              <a:t>06/05/2024</a:t>
+              <a:t>08/05/2024</a:t>
             </a:fld>
             <a:endParaRPr lang="es-MX"/>
           </a:p>
@@ -4496,7 +4496,7 @@
           <a:p>
             <a:fld id="{A6D3EF77-317B-41C0-9349-43E9BC462C98}" type="datetimeFigureOut">
               <a:rPr lang="es-MX" smtClean="0"/>
-              <a:t>06/05/2024</a:t>
+              <a:t>08/05/2024</a:t>
             </a:fld>
             <a:endParaRPr lang="es-MX"/>
           </a:p>
@@ -4591,7 +4591,7 @@
           <a:p>
             <a:fld id="{A6D3EF77-317B-41C0-9349-43E9BC462C98}" type="datetimeFigureOut">
               <a:rPr lang="es-MX" smtClean="0"/>
-              <a:t>06/05/2024</a:t>
+              <a:t>08/05/2024</a:t>
             </a:fld>
             <a:endParaRPr lang="es-MX"/>
           </a:p>
@@ -4846,7 +4846,7 @@
           <a:p>
             <a:fld id="{A6D3EF77-317B-41C0-9349-43E9BC462C98}" type="datetimeFigureOut">
               <a:rPr lang="es-MX" smtClean="0"/>
-              <a:t>06/05/2024</a:t>
+              <a:t>08/05/2024</a:t>
             </a:fld>
             <a:endParaRPr lang="es-MX"/>
           </a:p>
@@ -5146,7 +5146,7 @@
           <a:p>
             <a:fld id="{A6D3EF77-317B-41C0-9349-43E9BC462C98}" type="datetimeFigureOut">
               <a:rPr lang="es-MX" smtClean="0"/>
-              <a:t>06/05/2024</a:t>
+              <a:t>08/05/2024</a:t>
             </a:fld>
             <a:endParaRPr lang="es-MX"/>
           </a:p>
@@ -5380,7 +5380,7 @@
           <a:p>
             <a:fld id="{A6D3EF77-317B-41C0-9349-43E9BC462C98}" type="datetimeFigureOut">
               <a:rPr lang="es-MX" smtClean="0"/>
-              <a:t>06/05/2024</a:t>
+              <a:t>08/05/2024</a:t>
             </a:fld>
             <a:endParaRPr lang="es-MX"/>
           </a:p>
@@ -10956,24 +10956,15 @@
           <a:p>
             <a:r>
               <a:rPr lang="es-MX" dirty="0"/>
-              <a:t>Otra manera de incluir CSS en tu </a:t>
-            </a:r>
-            <a:r>
-              <a:rPr lang="es-MX" dirty="0" err="1"/>
-              <a:t>html</a:t>
-            </a:r>
-            <a:r>
-              <a:rPr lang="es-MX" dirty="0"/>
-              <a:t> es utilizando el atributo “</a:t>
-            </a:r>
-            <a:r>
-              <a:rPr lang="es-MX" dirty="0" err="1"/>
-              <a:t>style</a:t>
-            </a:r>
-            <a:r>
-              <a:rPr lang="es-MX" dirty="0"/>
-              <a:t>”</a:t>
-            </a:r>
+              <a:t>En el Head </a:t>
+            </a:r>
+            <a:r>
+              <a:rPr lang="es-MX" dirty="0">
+                <a:sym typeface="Wingdings" panose="05000000000000000000" pitchFamily="2" charset="2"/>
+              </a:rPr>
+              <a:t> link </a:t>
+            </a:r>
+            <a:endParaRPr lang="es-MX" dirty="0"/>
           </a:p>
         </p:txBody>
       </p:sp>
@@ -13586,7 +13577,7 @@
                   <a:srgbClr val="FFFF00"/>
                 </a:highlight>
               </a:rPr>
-              <a:t>descendente</a:t>
+              <a:t>descendiente</a:t>
             </a:r>
             <a:r>
               <a:rPr lang="es-MX" sz="2400" dirty="0"/>

</xml_diff>